<commit_message>
Added Json Serialization support Added possibility to create ncbo annotations from serialized json file (Added event handling model to deal with the json serialization) Added possibility to expand concept mappings and store them in json format. Added configuration options to - use additional json serialization - expand mappings - include synonyms - add semantic types - add cuis
The current config options are now being logged.
Added missing prefixes to Prefix class. Now using one central
Prefix.class in commons project (removed the one from text-structure
project).

Added jsonProcessing unit test in TestOaAnnotationModel
</commit_message>
<xml_diff>
--- a/se4ojs/resources/doc/OA_dataModel/KOBPSY2 Annotation Data Model.pptx
+++ b/se4ojs/resources/doc/OA_dataModel/KOBPSY2 Annotation Data Model.pptx
@@ -246,7 +246,7 @@
           <a:p>
             <a:fld id="{1F3A71BF-17E6-4649-92BC-B6EE46BF94E2}" type="datetimeFigureOut">
               <a:rPr lang="en-US" smtClean="0"/>
-              <a:t>1/26/2016</a:t>
+              <a:t>6/23/2016</a:t>
             </a:fld>
             <a:endParaRPr lang="en-US"/>
           </a:p>
@@ -416,7 +416,7 @@
           <a:p>
             <a:fld id="{1F3A71BF-17E6-4649-92BC-B6EE46BF94E2}" type="datetimeFigureOut">
               <a:rPr lang="en-US" smtClean="0"/>
-              <a:t>1/26/2016</a:t>
+              <a:t>6/23/2016</a:t>
             </a:fld>
             <a:endParaRPr lang="en-US"/>
           </a:p>
@@ -596,7 +596,7 @@
           <a:p>
             <a:fld id="{1F3A71BF-17E6-4649-92BC-B6EE46BF94E2}" type="datetimeFigureOut">
               <a:rPr lang="en-US" smtClean="0"/>
-              <a:t>1/26/2016</a:t>
+              <a:t>6/23/2016</a:t>
             </a:fld>
             <a:endParaRPr lang="en-US"/>
           </a:p>
@@ -766,7 +766,7 @@
           <a:p>
             <a:fld id="{1F3A71BF-17E6-4649-92BC-B6EE46BF94E2}" type="datetimeFigureOut">
               <a:rPr lang="en-US" smtClean="0"/>
-              <a:t>1/26/2016</a:t>
+              <a:t>6/23/2016</a:t>
             </a:fld>
             <a:endParaRPr lang="en-US"/>
           </a:p>
@@ -1012,7 +1012,7 @@
           <a:p>
             <a:fld id="{1F3A71BF-17E6-4649-92BC-B6EE46BF94E2}" type="datetimeFigureOut">
               <a:rPr lang="en-US" smtClean="0"/>
-              <a:t>1/26/2016</a:t>
+              <a:t>6/23/2016</a:t>
             </a:fld>
             <a:endParaRPr lang="en-US"/>
           </a:p>
@@ -1244,7 +1244,7 @@
           <a:p>
             <a:fld id="{1F3A71BF-17E6-4649-92BC-B6EE46BF94E2}" type="datetimeFigureOut">
               <a:rPr lang="en-US" smtClean="0"/>
-              <a:t>1/26/2016</a:t>
+              <a:t>6/23/2016</a:t>
             </a:fld>
             <a:endParaRPr lang="en-US"/>
           </a:p>
@@ -1611,7 +1611,7 @@
           <a:p>
             <a:fld id="{1F3A71BF-17E6-4649-92BC-B6EE46BF94E2}" type="datetimeFigureOut">
               <a:rPr lang="en-US" smtClean="0"/>
-              <a:t>1/26/2016</a:t>
+              <a:t>6/23/2016</a:t>
             </a:fld>
             <a:endParaRPr lang="en-US"/>
           </a:p>
@@ -1729,7 +1729,7 @@
           <a:p>
             <a:fld id="{1F3A71BF-17E6-4649-92BC-B6EE46BF94E2}" type="datetimeFigureOut">
               <a:rPr lang="en-US" smtClean="0"/>
-              <a:t>1/26/2016</a:t>
+              <a:t>6/23/2016</a:t>
             </a:fld>
             <a:endParaRPr lang="en-US"/>
           </a:p>
@@ -1824,7 +1824,7 @@
           <a:p>
             <a:fld id="{1F3A71BF-17E6-4649-92BC-B6EE46BF94E2}" type="datetimeFigureOut">
               <a:rPr lang="en-US" smtClean="0"/>
-              <a:t>1/26/2016</a:t>
+              <a:t>6/23/2016</a:t>
             </a:fld>
             <a:endParaRPr lang="en-US"/>
           </a:p>
@@ -2101,7 +2101,7 @@
           <a:p>
             <a:fld id="{1F3A71BF-17E6-4649-92BC-B6EE46BF94E2}" type="datetimeFigureOut">
               <a:rPr lang="en-US" smtClean="0"/>
-              <a:t>1/26/2016</a:t>
+              <a:t>6/23/2016</a:t>
             </a:fld>
             <a:endParaRPr lang="en-US"/>
           </a:p>
@@ -2354,7 +2354,7 @@
           <a:p>
             <a:fld id="{1F3A71BF-17E6-4649-92BC-B6EE46BF94E2}" type="datetimeFigureOut">
               <a:rPr lang="en-US" smtClean="0"/>
-              <a:t>1/26/2016</a:t>
+              <a:t>6/23/2016</a:t>
             </a:fld>
             <a:endParaRPr lang="en-US"/>
           </a:p>
@@ -2567,7 +2567,7 @@
           <a:p>
             <a:fld id="{1F3A71BF-17E6-4649-92BC-B6EE46BF94E2}" type="datetimeFigureOut">
               <a:rPr lang="en-US" smtClean="0"/>
-              <a:t>1/26/2016</a:t>
+              <a:t>6/23/2016</a:t>
             </a:fld>
             <a:endParaRPr lang="en-US"/>
           </a:p>
@@ -5473,6 +5473,40 @@
           </a:p>
         </p:txBody>
       </p:sp>
+      <p:cxnSp>
+        <p:nvCxnSpPr>
+          <p:cNvPr id="72" name="Gerade Verbindung mit Pfeil 71"/>
+          <p:cNvCxnSpPr/>
+          <p:nvPr/>
+        </p:nvCxnSpPr>
+        <p:spPr>
+          <a:xfrm>
+            <a:off x="7062326" y="3934857"/>
+            <a:ext cx="2024527" cy="644547"/>
+          </a:xfrm>
+          <a:prstGeom prst="straightConnector1">
+            <a:avLst/>
+          </a:prstGeom>
+          <a:ln>
+            <a:prstDash val="sysDash"/>
+            <a:tailEnd type="triangle"/>
+          </a:ln>
+        </p:spPr>
+        <p:style>
+          <a:lnRef idx="1">
+            <a:schemeClr val="accent1"/>
+          </a:lnRef>
+          <a:fillRef idx="0">
+            <a:schemeClr val="accent1"/>
+          </a:fillRef>
+          <a:effectRef idx="0">
+            <a:schemeClr val="accent1"/>
+          </a:effectRef>
+          <a:fontRef idx="minor">
+            <a:schemeClr val="tx1"/>
+          </a:fontRef>
+        </p:style>
+      </p:cxnSp>
     </p:spTree>
     <p:extLst>
       <p:ext uri="{BB962C8B-B14F-4D97-AF65-F5344CB8AC3E}">
@@ -6934,7 +6968,26 @@
                   <a:schemeClr val="tx1"/>
                 </a:solidFill>
               </a:rPr>
-              <a:t>generated uuid</a:t>
+              <a:t>textpos-Selector</a:t>
+            </a:r>
+          </a:p>
+          <a:p>
+            <a:pPr algn="ctr"/>
+            <a:r>
+              <a:rPr lang="de-DE" sz="800" smtClean="0">
+                <a:solidFill>
+                  <a:schemeClr val="tx1"/>
+                </a:solidFill>
+              </a:rPr>
+              <a:t>paragraph </a:t>
+            </a:r>
+            <a:r>
+              <a:rPr lang="de-DE" sz="800">
+                <a:solidFill>
+                  <a:schemeClr val="tx1"/>
+                </a:solidFill>
+              </a:rPr>
+              <a:t>fragment Uri + textPosUri</a:t>
             </a:r>
           </a:p>
         </p:txBody>
@@ -6987,8 +7040,37 @@
                   <a:schemeClr val="tx1"/>
                 </a:solidFill>
               </a:rPr>
-              <a:t>generated uuid</a:t>
-            </a:r>
+              <a:t>paragraph-Selector</a:t>
+            </a:r>
+            <a:endParaRPr lang="de-DE" sz="1200">
+              <a:solidFill>
+                <a:schemeClr val="tx1"/>
+              </a:solidFill>
+            </a:endParaRPr>
+          </a:p>
+          <a:p>
+            <a:pPr algn="ctr"/>
+            <a:endParaRPr lang="de-DE" sz="800" smtClean="0">
+              <a:solidFill>
+                <a:schemeClr val="tx1"/>
+              </a:solidFill>
+            </a:endParaRPr>
+          </a:p>
+          <a:p>
+            <a:pPr algn="ctr"/>
+            <a:r>
+              <a:rPr lang="de-DE" sz="800" smtClean="0">
+                <a:solidFill>
+                  <a:schemeClr val="tx1"/>
+                </a:solidFill>
+              </a:rPr>
+              <a:t>paragraphFragmentUri</a:t>
+            </a:r>
+            <a:endParaRPr lang="de-DE" sz="800">
+              <a:solidFill>
+                <a:schemeClr val="tx1"/>
+              </a:solidFill>
+            </a:endParaRPr>
           </a:p>
         </p:txBody>
       </p:sp>
@@ -7035,13 +7117,42 @@
           <a:p>
             <a:pPr algn="ctr"/>
             <a:r>
-              <a:rPr lang="de-DE" sz="1200" smtClean="0">
+              <a:rPr lang="de-DE" sz="1050" smtClean="0">
                 <a:solidFill>
                   <a:schemeClr val="tx1"/>
                 </a:solidFill>
               </a:rPr>
-              <a:t>generated uuid</a:t>
-            </a:r>
+              <a:t>exactMatch-Selector</a:t>
+            </a:r>
+            <a:endParaRPr lang="de-DE" sz="1050">
+              <a:solidFill>
+                <a:schemeClr val="tx1"/>
+              </a:solidFill>
+            </a:endParaRPr>
+          </a:p>
+          <a:p>
+            <a:pPr algn="ctr"/>
+            <a:endParaRPr lang="de-DE" sz="800" smtClean="0">
+              <a:solidFill>
+                <a:schemeClr val="tx1"/>
+              </a:solidFill>
+            </a:endParaRPr>
+          </a:p>
+          <a:p>
+            <a:pPr algn="ctr"/>
+            <a:r>
+              <a:rPr lang="de-DE" sz="800" smtClean="0">
+                <a:solidFill>
+                  <a:schemeClr val="tx1"/>
+                </a:solidFill>
+              </a:rPr>
+              <a:t>exactMatchUri</a:t>
+            </a:r>
+            <a:endParaRPr lang="de-DE" sz="800">
+              <a:solidFill>
+                <a:schemeClr val="tx1"/>
+              </a:solidFill>
+            </a:endParaRPr>
           </a:p>
         </p:txBody>
       </p:sp>

</xml_diff>